<commit_message>
updated System Design graphic
</commit_message>
<xml_diff>
--- a/Datasheets/Gyro_system.pptx
+++ b/Datasheets/Gyro_system.pptx
@@ -4233,7 +4233,7 @@
             <a:graphicData uri="http://schemas.openxmlformats.org/presentationml/2006/ole">
               <mc:AlternateContent xmlns:mc="http://schemas.openxmlformats.org/markup-compatibility/2006">
                 <mc:Choice xmlns:v="urn:schemas-microsoft-com:vml" Requires="v">
-                  <p:oleObj spid="_x0000_s1055" name="Equation" r:id="rId3" imgW="228600" imgH="228600" progId="Equation.DSMT4">
+                  <p:oleObj spid="_x0000_s1065" name="Equation" r:id="rId3" imgW="228600" imgH="228600" progId="Equation.DSMT4">
                     <p:embed/>
                   </p:oleObj>
                 </mc:Choice>
@@ -4355,7 +4355,7 @@
           <a:graphicData uri="http://schemas.openxmlformats.org/presentationml/2006/ole">
             <mc:AlternateContent xmlns:mc="http://schemas.openxmlformats.org/markup-compatibility/2006">
               <mc:Choice xmlns:v="urn:schemas-microsoft-com:vml" Requires="v">
-                <p:oleObj spid="_x0000_s1056" name="Equation" r:id="rId5" imgW="1282680" imgH="279360" progId="Equation.DSMT4">
+                <p:oleObj spid="_x0000_s1066" name="Equation" r:id="rId5" imgW="1282680" imgH="279360" progId="Equation.DSMT4">
                   <p:embed/>
                 </p:oleObj>
               </mc:Choice>
@@ -4412,7 +4412,7 @@
           <a:graphicData uri="http://schemas.openxmlformats.org/presentationml/2006/ole">
             <mc:AlternateContent xmlns:mc="http://schemas.openxmlformats.org/markup-compatibility/2006">
               <mc:Choice xmlns:v="urn:schemas-microsoft-com:vml" Requires="v">
-                <p:oleObj spid="_x0000_s1057" name="Equation" r:id="rId7" imgW="1625400" imgH="253800" progId="Equation.DSMT4">
+                <p:oleObj spid="_x0000_s1067" name="Equation" r:id="rId7" imgW="1625400" imgH="253800" progId="Equation.DSMT4">
                   <p:embed/>
                 </p:oleObj>
               </mc:Choice>
@@ -4469,7 +4469,7 @@
           <a:graphicData uri="http://schemas.openxmlformats.org/presentationml/2006/ole">
             <mc:AlternateContent xmlns:mc="http://schemas.openxmlformats.org/markup-compatibility/2006">
               <mc:Choice xmlns:v="urn:schemas-microsoft-com:vml" Requires="v">
-                <p:oleObj spid="_x0000_s1058" name="Equation" r:id="rId9" imgW="1384200" imgH="241200" progId="Equation.DSMT4">
+                <p:oleObj spid="_x0000_s1068" name="Equation" r:id="rId9" imgW="1384200" imgH="241200" progId="Equation.DSMT4">
                   <p:embed/>
                 </p:oleObj>
               </mc:Choice>
@@ -4526,7 +4526,7 @@
           <a:graphicData uri="http://schemas.openxmlformats.org/presentationml/2006/ole">
             <mc:AlternateContent xmlns:mc="http://schemas.openxmlformats.org/markup-compatibility/2006">
               <mc:Choice xmlns:v="urn:schemas-microsoft-com:vml" Requires="v">
-                <p:oleObj spid="_x0000_s1059" name="Equation" r:id="rId11" imgW="901440" imgH="279360" progId="Equation.DSMT4">
+                <p:oleObj spid="_x0000_s1069" name="Equation" r:id="rId11" imgW="901440" imgH="279360" progId="Equation.DSMT4">
                   <p:embed/>
                 </p:oleObj>
               </mc:Choice>
@@ -4828,7 +4828,7 @@
               <a:pPr algn="r"/>
               <a:r>
                 <a:rPr lang="en-US" sz="1200" dirty="0" smtClean="0"/>
-                <a:t>Attitude</a:t>
+                <a:t>Pitch</a:t>
               </a:r>
             </a:p>
           </p:txBody>
@@ -5103,11 +5103,19 @@
           <a:p>
             <a:r>
               <a:rPr lang="en-US" dirty="0" smtClean="0"/>
-              <a:t>Mary Lou </a:t>
+              <a:t>Mary </a:t>
+            </a:r>
+            <a:r>
+              <a:rPr lang="en-US" smtClean="0"/>
+              <a:t>Lou </a:t>
+            </a:r>
+            <a:r>
+              <a:rPr lang="en-US" smtClean="0"/>
+              <a:t>System </a:t>
             </a:r>
             <a:r>
               <a:rPr lang="en-US" dirty="0" smtClean="0"/>
-              <a:t>Overall System Design</a:t>
+              <a:t>Design</a:t>
             </a:r>
             <a:endParaRPr lang="en-US" dirty="0"/>
           </a:p>

</xml_diff>